<commit_message>
Updating analysis 1 for presentation.  Updating presentation
</commit_message>
<xml_diff>
--- a/presentation/Presentation1.pptx
+++ b/presentation/Presentation1.pptx
@@ -13,9 +13,13 @@
     <p:sldId id="258" r:id="rId7"/>
     <p:sldId id="260" r:id="rId8"/>
     <p:sldId id="266" r:id="rId9"/>
-    <p:sldId id="261" r:id="rId10"/>
-    <p:sldId id="262" r:id="rId11"/>
-    <p:sldId id="263" r:id="rId12"/>
+    <p:sldId id="270" r:id="rId10"/>
+    <p:sldId id="267" r:id="rId11"/>
+    <p:sldId id="268" r:id="rId12"/>
+    <p:sldId id="269" r:id="rId13"/>
+    <p:sldId id="261" r:id="rId14"/>
+    <p:sldId id="262" r:id="rId15"/>
+    <p:sldId id="263" r:id="rId16"/>
   </p:sldIdLst>
   <p:sldSz cx="12192000" cy="6858000"/>
   <p:notesSz cx="6858000" cy="9144000"/>
@@ -3426,6 +3430,351 @@
           <p:cNvPr id="2" name="Title 1">
             <a:extLst>
               <a:ext uri="{FF2B5EF4-FFF2-40B4-BE49-F238E27FC236}">
+                <a16:creationId xmlns:a16="http://schemas.microsoft.com/office/drawing/2014/main" id="{EC315615-69D8-AE91-2610-C363E6253759}"/>
+              </a:ext>
+            </a:extLst>
+          </p:cNvPr>
+          <p:cNvSpPr>
+            <a:spLocks noGrp="1"/>
+          </p:cNvSpPr>
+          <p:nvPr>
+            <p:ph type="title"/>
+          </p:nvPr>
+        </p:nvSpPr>
+        <p:spPr/>
+        <p:txBody>
+          <a:bodyPr/>
+          <a:lstStyle/>
+          <a:p>
+            <a:r>
+              <a:rPr lang="en-US" dirty="0"/>
+              <a:t>Analysis 3 – Issue Resolve Time</a:t>
+            </a:r>
+          </a:p>
+        </p:txBody>
+      </p:sp>
+      <p:pic>
+        <p:nvPicPr>
+          <p:cNvPr id="5" name="Picture 4" descr="A graph with a number of points&#10;&#10;AI-generated content may be incorrect.">
+            <a:extLst>
+              <a:ext uri="{FF2B5EF4-FFF2-40B4-BE49-F238E27FC236}">
+                <a16:creationId xmlns:a16="http://schemas.microsoft.com/office/drawing/2014/main" id="{BA6812B2-2054-F099-F1A3-93D647D416AA}"/>
+              </a:ext>
+            </a:extLst>
+          </p:cNvPr>
+          <p:cNvPicPr>
+            <a:picLocks noChangeAspect="1"/>
+          </p:cNvPicPr>
+          <p:nvPr/>
+        </p:nvPicPr>
+        <p:blipFill>
+          <a:blip r:embed="rId2"/>
+          <a:stretch>
+            <a:fillRect/>
+          </a:stretch>
+        </p:blipFill>
+        <p:spPr>
+          <a:xfrm>
+            <a:off x="679576" y="1543050"/>
+            <a:ext cx="8249708" cy="4949825"/>
+          </a:xfrm>
+          <a:prstGeom prst="rect">
+            <a:avLst/>
+          </a:prstGeom>
+        </p:spPr>
+      </p:pic>
+    </p:spTree>
+    <p:extLst>
+      <p:ext uri="{BB962C8B-B14F-4D97-AF65-F5344CB8AC3E}">
+        <p14:creationId xmlns:p14="http://schemas.microsoft.com/office/powerpoint/2010/main" val="3058538079"/>
+      </p:ext>
+    </p:extLst>
+  </p:cSld>
+  <p:clrMapOvr>
+    <a:masterClrMapping/>
+  </p:clrMapOvr>
+</p:sld>
+</file>
+
+<file path=ppt/slides/slide11.xml><?xml version="1.0" encoding="utf-8"?>
+<p:sld xmlns:a="http://schemas.openxmlformats.org/drawingml/2006/main" xmlns:r="http://schemas.openxmlformats.org/officeDocument/2006/relationships" xmlns:p="http://schemas.openxmlformats.org/presentationml/2006/main">
+  <p:cSld>
+    <p:spTree>
+      <p:nvGrpSpPr>
+        <p:cNvPr id="1" name=""/>
+        <p:cNvGrpSpPr/>
+        <p:nvPr/>
+      </p:nvGrpSpPr>
+      <p:grpSpPr>
+        <a:xfrm>
+          <a:off x="0" y="0"/>
+          <a:ext cx="0" cy="0"/>
+          <a:chOff x="0" y="0"/>
+          <a:chExt cx="0" cy="0"/>
+        </a:xfrm>
+      </p:grpSpPr>
+      <p:sp>
+        <p:nvSpPr>
+          <p:cNvPr id="2" name="Title 1">
+            <a:extLst>
+              <a:ext uri="{FF2B5EF4-FFF2-40B4-BE49-F238E27FC236}">
+                <a16:creationId xmlns:a16="http://schemas.microsoft.com/office/drawing/2014/main" id="{BB1AFDA7-B5B6-9932-9215-74AF98A33A6F}"/>
+              </a:ext>
+            </a:extLst>
+          </p:cNvPr>
+          <p:cNvSpPr>
+            <a:spLocks noGrp="1"/>
+          </p:cNvSpPr>
+          <p:nvPr>
+            <p:ph type="title"/>
+          </p:nvPr>
+        </p:nvSpPr>
+        <p:spPr/>
+        <p:txBody>
+          <a:bodyPr/>
+          <a:lstStyle/>
+          <a:p>
+            <a:r>
+              <a:rPr lang="en-US" dirty="0"/>
+              <a:t>Analysis 3 – Issue Resolve Time</a:t>
+            </a:r>
+          </a:p>
+        </p:txBody>
+      </p:sp>
+      <p:pic>
+        <p:nvPicPr>
+          <p:cNvPr id="5" name="Content Placeholder 4" descr="A chart with different colored bars&#10;&#10;AI-generated content may be incorrect.">
+            <a:extLst>
+              <a:ext uri="{FF2B5EF4-FFF2-40B4-BE49-F238E27FC236}">
+                <a16:creationId xmlns:a16="http://schemas.microsoft.com/office/drawing/2014/main" id="{918C0B70-3C5A-A604-CA89-A27B0F51BBC8}"/>
+              </a:ext>
+            </a:extLst>
+          </p:cNvPr>
+          <p:cNvPicPr>
+            <a:picLocks noGrp="1" noChangeAspect="1"/>
+          </p:cNvPicPr>
+          <p:nvPr>
+            <p:ph idx="1"/>
+          </p:nvPr>
+        </p:nvPicPr>
+        <p:blipFill>
+          <a:blip r:embed="rId2"/>
+          <a:stretch>
+            <a:fillRect/>
+          </a:stretch>
+        </p:blipFill>
+        <p:spPr>
+          <a:xfrm>
+            <a:off x="2317750" y="2115344"/>
+            <a:ext cx="7556500" cy="3771900"/>
+          </a:xfrm>
+        </p:spPr>
+      </p:pic>
+    </p:spTree>
+    <p:extLst>
+      <p:ext uri="{BB962C8B-B14F-4D97-AF65-F5344CB8AC3E}">
+        <p14:creationId xmlns:p14="http://schemas.microsoft.com/office/powerpoint/2010/main" val="2079022593"/>
+      </p:ext>
+    </p:extLst>
+  </p:cSld>
+  <p:clrMapOvr>
+    <a:masterClrMapping/>
+  </p:clrMapOvr>
+</p:sld>
+</file>
+
+<file path=ppt/slides/slide12.xml><?xml version="1.0" encoding="utf-8"?>
+<p:sld xmlns:a="http://schemas.openxmlformats.org/drawingml/2006/main" xmlns:r="http://schemas.openxmlformats.org/officeDocument/2006/relationships" xmlns:p="http://schemas.openxmlformats.org/presentationml/2006/main">
+  <p:cSld>
+    <p:spTree>
+      <p:nvGrpSpPr>
+        <p:cNvPr id="1" name=""/>
+        <p:cNvGrpSpPr/>
+        <p:nvPr/>
+      </p:nvGrpSpPr>
+      <p:grpSpPr>
+        <a:xfrm>
+          <a:off x="0" y="0"/>
+          <a:ext cx="0" cy="0"/>
+          <a:chOff x="0" y="0"/>
+          <a:chExt cx="0" cy="0"/>
+        </a:xfrm>
+      </p:grpSpPr>
+      <p:sp>
+        <p:nvSpPr>
+          <p:cNvPr id="2" name="Title 1">
+            <a:extLst>
+              <a:ext uri="{FF2B5EF4-FFF2-40B4-BE49-F238E27FC236}">
+                <a16:creationId xmlns:a16="http://schemas.microsoft.com/office/drawing/2014/main" id="{30A16CD1-03D3-1F84-746B-228D67AF1F99}"/>
+              </a:ext>
+            </a:extLst>
+          </p:cNvPr>
+          <p:cNvSpPr>
+            <a:spLocks noGrp="1"/>
+          </p:cNvSpPr>
+          <p:nvPr>
+            <p:ph type="title"/>
+          </p:nvPr>
+        </p:nvSpPr>
+        <p:spPr/>
+        <p:txBody>
+          <a:bodyPr/>
+          <a:lstStyle/>
+          <a:p>
+            <a:r>
+              <a:rPr lang="en-US" dirty="0"/>
+              <a:t>Analysis 3 – Issue Resolve Time</a:t>
+            </a:r>
+          </a:p>
+        </p:txBody>
+      </p:sp>
+      <p:pic>
+        <p:nvPicPr>
+          <p:cNvPr id="5" name="Content Placeholder 4" descr="A graph with blue dots and red line&#10;&#10;AI-generated content may be incorrect.">
+            <a:extLst>
+              <a:ext uri="{FF2B5EF4-FFF2-40B4-BE49-F238E27FC236}">
+                <a16:creationId xmlns:a16="http://schemas.microsoft.com/office/drawing/2014/main" id="{90E499F9-5EBA-7E99-D72F-980A766919CC}"/>
+              </a:ext>
+            </a:extLst>
+          </p:cNvPr>
+          <p:cNvPicPr>
+            <a:picLocks noGrp="1" noChangeAspect="1"/>
+          </p:cNvPicPr>
+          <p:nvPr>
+            <p:ph idx="1"/>
+          </p:nvPr>
+        </p:nvPicPr>
+        <p:blipFill>
+          <a:blip r:embed="rId2"/>
+          <a:stretch>
+            <a:fillRect/>
+          </a:stretch>
+        </p:blipFill>
+        <p:spPr>
+          <a:xfrm>
+            <a:off x="2078008" y="1690688"/>
+            <a:ext cx="8035984" cy="4802188"/>
+          </a:xfrm>
+        </p:spPr>
+      </p:pic>
+    </p:spTree>
+    <p:extLst>
+      <p:ext uri="{BB962C8B-B14F-4D97-AF65-F5344CB8AC3E}">
+        <p14:creationId xmlns:p14="http://schemas.microsoft.com/office/powerpoint/2010/main" val="3630668345"/>
+      </p:ext>
+    </p:extLst>
+  </p:cSld>
+  <p:clrMapOvr>
+    <a:masterClrMapping/>
+  </p:clrMapOvr>
+</p:sld>
+</file>
+
+<file path=ppt/slides/slide13.xml><?xml version="1.0" encoding="utf-8"?>
+<p:sld xmlns:a="http://schemas.openxmlformats.org/drawingml/2006/main" xmlns:r="http://schemas.openxmlformats.org/officeDocument/2006/relationships" xmlns:p="http://schemas.openxmlformats.org/presentationml/2006/main">
+  <p:cSld>
+    <p:spTree>
+      <p:nvGrpSpPr>
+        <p:cNvPr id="1" name=""/>
+        <p:cNvGrpSpPr/>
+        <p:nvPr/>
+      </p:nvGrpSpPr>
+      <p:grpSpPr>
+        <a:xfrm>
+          <a:off x="0" y="0"/>
+          <a:ext cx="0" cy="0"/>
+          <a:chOff x="0" y="0"/>
+          <a:chExt cx="0" cy="0"/>
+        </a:xfrm>
+      </p:grpSpPr>
+      <p:sp>
+        <p:nvSpPr>
+          <p:cNvPr id="2" name="Title 1">
+            <a:extLst>
+              <a:ext uri="{FF2B5EF4-FFF2-40B4-BE49-F238E27FC236}">
+                <a16:creationId xmlns:a16="http://schemas.microsoft.com/office/drawing/2014/main" id="{4E5157EA-5D10-970F-0CE8-1504C62072FA}"/>
+              </a:ext>
+            </a:extLst>
+          </p:cNvPr>
+          <p:cNvSpPr>
+            <a:spLocks noGrp="1"/>
+          </p:cNvSpPr>
+          <p:nvPr>
+            <p:ph type="title"/>
+          </p:nvPr>
+        </p:nvSpPr>
+        <p:spPr/>
+        <p:txBody>
+          <a:bodyPr/>
+          <a:lstStyle/>
+          <a:p>
+            <a:r>
+              <a:rPr lang="en-US" dirty="0"/>
+              <a:t>Testing</a:t>
+            </a:r>
+          </a:p>
+        </p:txBody>
+      </p:sp>
+      <p:sp>
+        <p:nvSpPr>
+          <p:cNvPr id="3" name="Content Placeholder 2">
+            <a:extLst>
+              <a:ext uri="{FF2B5EF4-FFF2-40B4-BE49-F238E27FC236}">
+                <a16:creationId xmlns:a16="http://schemas.microsoft.com/office/drawing/2014/main" id="{708ACB03-81A4-4AFD-6BC4-AB487E088321}"/>
+              </a:ext>
+            </a:extLst>
+          </p:cNvPr>
+          <p:cNvSpPr>
+            <a:spLocks noGrp="1"/>
+          </p:cNvSpPr>
+          <p:nvPr>
+            <p:ph idx="1"/>
+          </p:nvPr>
+        </p:nvSpPr>
+        <p:spPr/>
+        <p:txBody>
+          <a:bodyPr/>
+          <a:lstStyle/>
+          <a:p>
+            <a:endParaRPr lang="en-US"/>
+          </a:p>
+        </p:txBody>
+      </p:sp>
+    </p:spTree>
+    <p:extLst>
+      <p:ext uri="{BB962C8B-B14F-4D97-AF65-F5344CB8AC3E}">
+        <p14:creationId xmlns:p14="http://schemas.microsoft.com/office/powerpoint/2010/main" val="4136157341"/>
+      </p:ext>
+    </p:extLst>
+  </p:cSld>
+  <p:clrMapOvr>
+    <a:masterClrMapping/>
+  </p:clrMapOvr>
+</p:sld>
+</file>
+
+<file path=ppt/slides/slide14.xml><?xml version="1.0" encoding="utf-8"?>
+<p:sld xmlns:a="http://schemas.openxmlformats.org/drawingml/2006/main" xmlns:r="http://schemas.openxmlformats.org/officeDocument/2006/relationships" xmlns:p="http://schemas.openxmlformats.org/presentationml/2006/main">
+  <p:cSld>
+    <p:spTree>
+      <p:nvGrpSpPr>
+        <p:cNvPr id="1" name=""/>
+        <p:cNvGrpSpPr/>
+        <p:nvPr/>
+      </p:nvGrpSpPr>
+      <p:grpSpPr>
+        <a:xfrm>
+          <a:off x="0" y="0"/>
+          <a:ext cx="0" cy="0"/>
+          <a:chOff x="0" y="0"/>
+          <a:chExt cx="0" cy="0"/>
+        </a:xfrm>
+      </p:grpSpPr>
+      <p:sp>
+        <p:nvSpPr>
+          <p:cNvPr id="2" name="Title 1">
+            <a:extLst>
+              <a:ext uri="{FF2B5EF4-FFF2-40B4-BE49-F238E27FC236}">
                 <a16:creationId xmlns:a16="http://schemas.microsoft.com/office/drawing/2014/main" id="{75CE0AB9-C9D9-9637-496A-EA5EA3F3345C}"/>
               </a:ext>
             </a:extLst>
@@ -3487,7 +3836,7 @@
 </p:sld>
 </file>
 
-<file path=ppt/slides/slide11.xml><?xml version="1.0" encoding="utf-8"?>
+<file path=ppt/slides/slide15.xml><?xml version="1.0" encoding="utf-8"?>
 <p:sld xmlns:a="http://schemas.openxmlformats.org/drawingml/2006/main" xmlns:r="http://schemas.openxmlformats.org/officeDocument/2006/relationships" xmlns:p="http://schemas.openxmlformats.org/presentationml/2006/main">
   <p:cSld>
     <p:spTree>
@@ -4316,10 +4665,380 @@
             </a:r>
           </a:p>
           <a:p>
+            <a:r>
+              <a:rPr lang="en-US" dirty="0"/>
+              <a:t>Packages used:</a:t>
+            </a:r>
+          </a:p>
+          <a:p>
+            <a:pPr lvl="1"/>
+            <a:r>
+              <a:rPr lang="en-US" dirty="0"/>
+              <a:t>Pandas</a:t>
+            </a:r>
+          </a:p>
+          <a:p>
+            <a:pPr lvl="1"/>
+            <a:r>
+              <a:rPr lang="en-US" dirty="0"/>
+              <a:t>Matplotlib</a:t>
+            </a:r>
+          </a:p>
+          <a:p>
+            <a:pPr lvl="1"/>
+            <a:r>
+              <a:rPr lang="en-US" dirty="0" err="1"/>
+              <a:t>Networkx</a:t>
+            </a:r>
             <a:endParaRPr lang="en-US" dirty="0"/>
           </a:p>
-        </p:txBody>
-      </p:sp>
+          <a:p>
+            <a:pPr lvl="1"/>
+            <a:r>
+              <a:rPr lang="en-US" dirty="0" err="1"/>
+              <a:t>Plotly</a:t>
+            </a:r>
+            <a:endParaRPr lang="en-US" dirty="0"/>
+          </a:p>
+          <a:p>
+            <a:pPr lvl="1"/>
+            <a:r>
+              <a:rPr lang="en-US" dirty="0"/>
+              <a:t>Seaborn</a:t>
+            </a:r>
+          </a:p>
+          <a:p>
+            <a:endParaRPr lang="en-US" dirty="0"/>
+          </a:p>
+        </p:txBody>
+      </p:sp>
+      <p:pic>
+        <p:nvPicPr>
+          <p:cNvPr id="2050" name="Picture 2" descr="pandas (software) - Wikipedia">
+            <a:extLst>
+              <a:ext uri="{FF2B5EF4-FFF2-40B4-BE49-F238E27FC236}">
+                <a16:creationId xmlns:a16="http://schemas.microsoft.com/office/drawing/2014/main" id="{CC23E097-1D15-ED29-C92B-DCC7B0420A0D}"/>
+              </a:ext>
+            </a:extLst>
+          </p:cNvPr>
+          <p:cNvPicPr>
+            <a:picLocks noChangeAspect="1" noChangeArrowheads="1"/>
+          </p:cNvPicPr>
+          <p:nvPr/>
+        </p:nvPicPr>
+        <p:blipFill>
+          <a:blip r:embed="rId2">
+            <a:extLst>
+              <a:ext uri="{28A0092B-C50C-407E-A947-70E740481C1C}">
+                <a14:useLocalDpi xmlns:a14="http://schemas.microsoft.com/office/drawing/2010/main" val="0"/>
+              </a:ext>
+            </a:extLst>
+          </a:blip>
+          <a:srcRect/>
+          <a:stretch>
+            <a:fillRect/>
+          </a:stretch>
+        </p:blipFill>
+        <p:spPr bwMode="auto">
+          <a:xfrm>
+            <a:off x="9482787" y="2412539"/>
+            <a:ext cx="2512446" cy="1017541"/>
+          </a:xfrm>
+          <a:prstGeom prst="rect">
+            <a:avLst/>
+          </a:prstGeom>
+          <a:noFill/>
+          <a:extLst>
+            <a:ext uri="{909E8E84-426E-40DD-AFC4-6F175D3DCCD1}">
+              <a14:hiddenFill xmlns:a14="http://schemas.microsoft.com/office/drawing/2010/main">
+                <a:solidFill>
+                  <a:srgbClr val="FFFFFF"/>
+                </a:solidFill>
+              </a14:hiddenFill>
+            </a:ext>
+          </a:extLst>
+        </p:spPr>
+      </p:pic>
+      <p:pic>
+        <p:nvPicPr>
+          <p:cNvPr id="2054" name="Picture 6" descr="Matplotlib">
+            <a:extLst>
+              <a:ext uri="{FF2B5EF4-FFF2-40B4-BE49-F238E27FC236}">
+                <a16:creationId xmlns:a16="http://schemas.microsoft.com/office/drawing/2014/main" id="{2B3EB0E3-B3D1-C2FD-E3E6-B1C30F4E7DCC}"/>
+              </a:ext>
+            </a:extLst>
+          </p:cNvPr>
+          <p:cNvPicPr>
+            <a:picLocks noChangeAspect="1" noChangeArrowheads="1"/>
+          </p:cNvPicPr>
+          <p:nvPr/>
+        </p:nvPicPr>
+        <p:blipFill>
+          <a:blip r:embed="rId3">
+            <a:extLst>
+              <a:ext uri="{28A0092B-C50C-407E-A947-70E740481C1C}">
+                <a14:useLocalDpi xmlns:a14="http://schemas.microsoft.com/office/drawing/2010/main" val="0"/>
+              </a:ext>
+            </a:extLst>
+          </a:blip>
+          <a:srcRect/>
+          <a:stretch>
+            <a:fillRect/>
+          </a:stretch>
+        </p:blipFill>
+        <p:spPr bwMode="auto">
+          <a:xfrm>
+            <a:off x="7538065" y="3803005"/>
+            <a:ext cx="1465449" cy="1465449"/>
+          </a:xfrm>
+          <a:prstGeom prst="rect">
+            <a:avLst/>
+          </a:prstGeom>
+          <a:noFill/>
+          <a:extLst>
+            <a:ext uri="{909E8E84-426E-40DD-AFC4-6F175D3DCCD1}">
+              <a14:hiddenFill xmlns:a14="http://schemas.microsoft.com/office/drawing/2010/main">
+                <a:solidFill>
+                  <a:srgbClr val="FFFFFF"/>
+                </a:solidFill>
+              </a14:hiddenFill>
+            </a:ext>
+          </a:extLst>
+        </p:spPr>
+      </p:pic>
+      <p:pic>
+        <p:nvPicPr>
+          <p:cNvPr id="2058" name="Picture 10" descr="Plotly - Wikipedia">
+            <a:extLst>
+              <a:ext uri="{FF2B5EF4-FFF2-40B4-BE49-F238E27FC236}">
+                <a16:creationId xmlns:a16="http://schemas.microsoft.com/office/drawing/2014/main" id="{E6657613-4B26-6937-405F-B5F2B2B7291F}"/>
+              </a:ext>
+            </a:extLst>
+          </p:cNvPr>
+          <p:cNvPicPr>
+            <a:picLocks noChangeAspect="1" noChangeArrowheads="1"/>
+          </p:cNvPicPr>
+          <p:nvPr/>
+        </p:nvPicPr>
+        <p:blipFill>
+          <a:blip r:embed="rId4">
+            <a:extLst>
+              <a:ext uri="{28A0092B-C50C-407E-A947-70E740481C1C}">
+                <a14:useLocalDpi xmlns:a14="http://schemas.microsoft.com/office/drawing/2010/main" val="0"/>
+              </a:ext>
+            </a:extLst>
+          </a:blip>
+          <a:srcRect/>
+          <a:stretch>
+            <a:fillRect/>
+          </a:stretch>
+        </p:blipFill>
+        <p:spPr bwMode="auto">
+          <a:xfrm>
+            <a:off x="6992178" y="877971"/>
+            <a:ext cx="2836191" cy="946136"/>
+          </a:xfrm>
+          <a:prstGeom prst="rect">
+            <a:avLst/>
+          </a:prstGeom>
+          <a:noFill/>
+          <a:extLst>
+            <a:ext uri="{909E8E84-426E-40DD-AFC4-6F175D3DCCD1}">
+              <a14:hiddenFill xmlns:a14="http://schemas.microsoft.com/office/drawing/2010/main">
+                <a:solidFill>
+                  <a:srgbClr val="FFFFFF"/>
+                </a:solidFill>
+              </a14:hiddenFill>
+            </a:ext>
+          </a:extLst>
+        </p:spPr>
+      </p:pic>
+      <p:pic>
+        <p:nvPicPr>
+          <p:cNvPr id="2060" name="Picture 12" descr="Seaborn for Data Visualization ...">
+            <a:extLst>
+              <a:ext uri="{FF2B5EF4-FFF2-40B4-BE49-F238E27FC236}">
+                <a16:creationId xmlns:a16="http://schemas.microsoft.com/office/drawing/2014/main" id="{7FDABC1C-66BB-5C35-4336-145BBBB72536}"/>
+              </a:ext>
+            </a:extLst>
+          </p:cNvPr>
+          <p:cNvPicPr>
+            <a:picLocks noChangeAspect="1" noChangeArrowheads="1"/>
+          </p:cNvPicPr>
+          <p:nvPr/>
+        </p:nvPicPr>
+        <p:blipFill>
+          <a:blip r:embed="rId5">
+            <a:extLst>
+              <a:ext uri="{28A0092B-C50C-407E-A947-70E740481C1C}">
+                <a14:useLocalDpi xmlns:a14="http://schemas.microsoft.com/office/drawing/2010/main" val="0"/>
+              </a:ext>
+            </a:extLst>
+          </a:blip>
+          <a:srcRect/>
+          <a:stretch>
+            <a:fillRect/>
+          </a:stretch>
+        </p:blipFill>
+        <p:spPr bwMode="auto">
+          <a:xfrm>
+            <a:off x="9482787" y="3924857"/>
+            <a:ext cx="2416464" cy="1208232"/>
+          </a:xfrm>
+          <a:prstGeom prst="rect">
+            <a:avLst/>
+          </a:prstGeom>
+          <a:noFill/>
+          <a:extLst>
+            <a:ext uri="{909E8E84-426E-40DD-AFC4-6F175D3DCCD1}">
+              <a14:hiddenFill xmlns:a14="http://schemas.microsoft.com/office/drawing/2010/main">
+                <a:solidFill>
+                  <a:srgbClr val="FFFFFF"/>
+                </a:solidFill>
+              </a14:hiddenFill>
+            </a:ext>
+          </a:extLst>
+        </p:spPr>
+      </p:pic>
+      <p:pic>
+        <p:nvPicPr>
+          <p:cNvPr id="2062" name="Picture 14" descr="NetworkX - Product vision - DESOSA">
+            <a:extLst>
+              <a:ext uri="{FF2B5EF4-FFF2-40B4-BE49-F238E27FC236}">
+                <a16:creationId xmlns:a16="http://schemas.microsoft.com/office/drawing/2014/main" id="{31A07A9A-5791-2062-29EE-5C99D326F088}"/>
+              </a:ext>
+            </a:extLst>
+          </p:cNvPr>
+          <p:cNvPicPr>
+            <a:picLocks noChangeAspect="1" noChangeArrowheads="1"/>
+          </p:cNvPicPr>
+          <p:nvPr/>
+        </p:nvPicPr>
+        <p:blipFill>
+          <a:blip r:embed="rId6">
+            <a:extLst>
+              <a:ext uri="{28A0092B-C50C-407E-A947-70E740481C1C}">
+                <a14:useLocalDpi xmlns:a14="http://schemas.microsoft.com/office/drawing/2010/main" val="0"/>
+              </a:ext>
+            </a:extLst>
+          </a:blip>
+          <a:srcRect/>
+          <a:stretch>
+            <a:fillRect/>
+          </a:stretch>
+        </p:blipFill>
+        <p:spPr bwMode="auto">
+          <a:xfrm>
+            <a:off x="7656161" y="5584365"/>
+            <a:ext cx="4065451" cy="908509"/>
+          </a:xfrm>
+          <a:prstGeom prst="rect">
+            <a:avLst/>
+          </a:prstGeom>
+          <a:noFill/>
+          <a:extLst>
+            <a:ext uri="{909E8E84-426E-40DD-AFC4-6F175D3DCCD1}">
+              <a14:hiddenFill xmlns:a14="http://schemas.microsoft.com/office/drawing/2010/main">
+                <a:solidFill>
+                  <a:srgbClr val="FFFFFF"/>
+                </a:solidFill>
+              </a14:hiddenFill>
+            </a:ext>
+          </a:extLst>
+        </p:spPr>
+      </p:pic>
+      <p:pic>
+        <p:nvPicPr>
+          <p:cNvPr id="2064" name="Picture 16" descr="What is Python Coding? | Juni Learning">
+            <a:extLst>
+              <a:ext uri="{FF2B5EF4-FFF2-40B4-BE49-F238E27FC236}">
+                <a16:creationId xmlns:a16="http://schemas.microsoft.com/office/drawing/2014/main" id="{EFF1D990-F3A4-FE7F-9878-C2F32AEAC522}"/>
+              </a:ext>
+            </a:extLst>
+          </p:cNvPr>
+          <p:cNvPicPr>
+            <a:picLocks noChangeAspect="1" noChangeArrowheads="1"/>
+          </p:cNvPicPr>
+          <p:nvPr/>
+        </p:nvPicPr>
+        <p:blipFill rotWithShape="1">
+          <a:blip r:embed="rId7">
+            <a:extLst>
+              <a:ext uri="{28A0092B-C50C-407E-A947-70E740481C1C}">
+                <a14:useLocalDpi xmlns:a14="http://schemas.microsoft.com/office/drawing/2010/main" val="0"/>
+              </a:ext>
+            </a:extLst>
+          </a:blip>
+          <a:srcRect l="16912" t="18084" r="13943" b="17019"/>
+          <a:stretch/>
+        </p:blipFill>
+        <p:spPr bwMode="auto">
+          <a:xfrm>
+            <a:off x="7478415" y="2118678"/>
+            <a:ext cx="1584750" cy="1487398"/>
+          </a:xfrm>
+          <a:prstGeom prst="rect">
+            <a:avLst/>
+          </a:prstGeom>
+          <a:noFill/>
+          <a:extLst>
+            <a:ext uri="{909E8E84-426E-40DD-AFC4-6F175D3DCCD1}">
+              <a14:hiddenFill xmlns:a14="http://schemas.microsoft.com/office/drawing/2010/main">
+                <a:solidFill>
+                  <a:srgbClr val="FFFFFF"/>
+                </a:solidFill>
+              </a14:hiddenFill>
+            </a:ext>
+          </a:extLst>
+        </p:spPr>
+      </p:pic>
+      <p:pic>
+        <p:nvPicPr>
+          <p:cNvPr id="2066" name="Picture 18" descr="How to use VS Code on FreeBSD | FreeBSD Foundation">
+            <a:extLst>
+              <a:ext uri="{FF2B5EF4-FFF2-40B4-BE49-F238E27FC236}">
+                <a16:creationId xmlns:a16="http://schemas.microsoft.com/office/drawing/2014/main" id="{8789AA58-FA53-1089-D8EE-E2F14FF3D525}"/>
+              </a:ext>
+            </a:extLst>
+          </p:cNvPr>
+          <p:cNvPicPr>
+            <a:picLocks noChangeAspect="1" noChangeArrowheads="1"/>
+          </p:cNvPicPr>
+          <p:nvPr/>
+        </p:nvPicPr>
+        <p:blipFill>
+          <a:blip r:embed="rId8">
+            <a:extLst>
+              <a:ext uri="{28A0092B-C50C-407E-A947-70E740481C1C}">
+                <a14:useLocalDpi xmlns:a14="http://schemas.microsoft.com/office/drawing/2010/main" val="0"/>
+              </a:ext>
+            </a:extLst>
+          </a:blip>
+          <a:srcRect/>
+          <a:stretch>
+            <a:fillRect/>
+          </a:stretch>
+        </p:blipFill>
+        <p:spPr bwMode="auto">
+          <a:xfrm>
+            <a:off x="10119823" y="681037"/>
+            <a:ext cx="1238374" cy="1238374"/>
+          </a:xfrm>
+          <a:prstGeom prst="rect">
+            <a:avLst/>
+          </a:prstGeom>
+          <a:noFill/>
+          <a:extLst>
+            <a:ext uri="{909E8E84-426E-40DD-AFC4-6F175D3DCCD1}">
+              <a14:hiddenFill xmlns:a14="http://schemas.microsoft.com/office/drawing/2010/main">
+                <a:solidFill>
+                  <a:srgbClr val="FFFFFF"/>
+                </a:solidFill>
+              </a14:hiddenFill>
+            </a:ext>
+          </a:extLst>
+        </p:spPr>
+      </p:pic>
     </p:spTree>
     <p:extLst>
       <p:ext uri="{BB962C8B-B14F-4D97-AF65-F5344CB8AC3E}">
@@ -4373,7 +5092,7 @@
           <a:p>
             <a:r>
               <a:rPr lang="en-US" dirty="0"/>
-              <a:t>Implementation – Analysis 1 (Time)</a:t>
+              <a:t>Analysis 1 – Issue Creation Over Time</a:t>
             </a:r>
           </a:p>
         </p:txBody>
@@ -4560,7 +5279,7 @@
           <p:cNvPr id="2" name="Title 1">
             <a:extLst>
               <a:ext uri="{FF2B5EF4-FFF2-40B4-BE49-F238E27FC236}">
-                <a16:creationId xmlns:a16="http://schemas.microsoft.com/office/drawing/2014/main" id="{4E5157EA-5D10-970F-0CE8-1504C62072FA}"/>
+                <a16:creationId xmlns:a16="http://schemas.microsoft.com/office/drawing/2014/main" id="{8FED8FDA-5B3B-5EB9-8968-32133F84E117}"/>
               </a:ext>
             </a:extLst>
           </p:cNvPr>
@@ -4578,40 +5297,44 @@
           <a:p>
             <a:r>
               <a:rPr lang="en-US" dirty="0"/>
-              <a:t>Testing</a:t>
-            </a:r>
-          </a:p>
-        </p:txBody>
-      </p:sp>
-      <p:sp>
-        <p:nvSpPr>
-          <p:cNvPr id="3" name="Content Placeholder 2">
-            <a:extLst>
-              <a:ext uri="{FF2B5EF4-FFF2-40B4-BE49-F238E27FC236}">
-                <a16:creationId xmlns:a16="http://schemas.microsoft.com/office/drawing/2014/main" id="{708ACB03-81A4-4AFD-6BC4-AB487E088321}"/>
-              </a:ext>
-            </a:extLst>
-          </p:cNvPr>
-          <p:cNvSpPr>
-            <a:spLocks noGrp="1"/>
-          </p:cNvSpPr>
+              <a:t>Analysis 2 – Contributor Network Graph</a:t>
+            </a:r>
+          </a:p>
+        </p:txBody>
+      </p:sp>
+      <p:pic>
+        <p:nvPicPr>
+          <p:cNvPr id="5" name="Content Placeholder 4" descr="A screenshot of a computer&#10;&#10;AI-generated content may be incorrect.">
+            <a:extLst>
+              <a:ext uri="{FF2B5EF4-FFF2-40B4-BE49-F238E27FC236}">
+                <a16:creationId xmlns:a16="http://schemas.microsoft.com/office/drawing/2014/main" id="{AF7E9BCE-098C-5A29-659E-F0C8A2ED581F}"/>
+              </a:ext>
+            </a:extLst>
+          </p:cNvPr>
+          <p:cNvPicPr>
+            <a:picLocks noGrp="1" noChangeAspect="1"/>
+          </p:cNvPicPr>
           <p:nvPr>
             <p:ph idx="1"/>
           </p:nvPr>
-        </p:nvSpPr>
-        <p:spPr/>
-        <p:txBody>
-          <a:bodyPr/>
-          <a:lstStyle/>
-          <a:p>
-            <a:endParaRPr lang="en-US"/>
-          </a:p>
-        </p:txBody>
-      </p:sp>
+        </p:nvPicPr>
+        <p:blipFill>
+          <a:blip r:embed="rId2"/>
+          <a:stretch>
+            <a:fillRect/>
+          </a:stretch>
+        </p:blipFill>
+        <p:spPr>
+          <a:xfrm>
+            <a:off x="1880461" y="1426474"/>
+            <a:ext cx="8431078" cy="5271024"/>
+          </a:xfrm>
+        </p:spPr>
+      </p:pic>
     </p:spTree>
     <p:extLst>
       <p:ext uri="{BB962C8B-B14F-4D97-AF65-F5344CB8AC3E}">
-        <p14:creationId xmlns:p14="http://schemas.microsoft.com/office/powerpoint/2010/main" val="4136157341"/>
+        <p14:creationId xmlns:p14="http://schemas.microsoft.com/office/powerpoint/2010/main" val="3693724767"/>
       </p:ext>
     </p:extLst>
   </p:cSld>

</xml_diff>